<commit_message>
updating presentation to latest v
</commit_message>
<xml_diff>
--- a/Presentation.pptx
+++ b/Presentation.pptx
@@ -5,19 +5,22 @@
     <p:sldMasterId id="2147483648" r:id="rId1"/>
   </p:sldMasterIdLst>
   <p:notesMasterIdLst>
-    <p:notesMasterId r:id="rId9"/>
+    <p:notesMasterId r:id="rId12"/>
   </p:notesMasterIdLst>
   <p:handoutMasterIdLst>
-    <p:handoutMasterId r:id="rId10"/>
+    <p:handoutMasterId r:id="rId13"/>
   </p:handoutMasterIdLst>
   <p:sldIdLst>
     <p:sldId id="256" r:id="rId2"/>
     <p:sldId id="258" r:id="rId3"/>
-    <p:sldId id="257" r:id="rId4"/>
-    <p:sldId id="259" r:id="rId5"/>
-    <p:sldId id="261" r:id="rId6"/>
-    <p:sldId id="262" r:id="rId7"/>
-    <p:sldId id="260" r:id="rId8"/>
+    <p:sldId id="264" r:id="rId4"/>
+    <p:sldId id="263" r:id="rId5"/>
+    <p:sldId id="265" r:id="rId6"/>
+    <p:sldId id="261" r:id="rId7"/>
+    <p:sldId id="266" r:id="rId8"/>
+    <p:sldId id="257" r:id="rId9"/>
+    <p:sldId id="262" r:id="rId10"/>
+    <p:sldId id="260" r:id="rId11"/>
   </p:sldIdLst>
   <p:sldSz cx="9144000" cy="6858000" type="screen4x3"/>
   <p:notesSz cx="6858000" cy="9144000"/>
@@ -201,7 +204,7 @@
           <a:p>
             <a:fld id="{42CB4955-F282-2F4B-92D5-81323965C8CA}" type="datetime1">
               <a:rPr lang="en-US" smtClean="0"/>
-              <a:t>4/4/11</a:t>
+              <a:t>4/5/11</a:t>
             </a:fld>
             <a:endParaRPr lang="en-US"/>
           </a:p>
@@ -367,7 +370,7 @@
           <a:p>
             <a:fld id="{5FF29E69-04D3-F240-B665-604482145B76}" type="datetime1">
               <a:rPr lang="en-US" smtClean="0"/>
-              <a:t>4/4/11</a:t>
+              <a:t>4/5/11</a:t>
             </a:fld>
             <a:endParaRPr lang="en-US"/>
           </a:p>
@@ -985,7 +988,7 @@
           <a:p>
             <a:fld id="{E230D438-8CE5-C24A-9942-3AF7BBFE0CE6}" type="datetime1">
               <a:rPr lang="en-US" smtClean="0"/>
-              <a:t>4/4/11</a:t>
+              <a:t>4/5/11</a:t>
             </a:fld>
             <a:endParaRPr lang="en-US"/>
           </a:p>
@@ -1047,13 +1050,13 @@
   <p:clrMapOvr>
     <a:masterClrMapping/>
   </p:clrMapOvr>
-  <mc:AlternateContent xmlns:mc="http://schemas.openxmlformats.org/markup-compatibility/2006">
-    <mc:Choice xmlns:p14="http://schemas.microsoft.com/office/powerpoint/2010/main" Requires="p14">
+  <mc:AlternateContent xmlns:mc="http://schemas.openxmlformats.org/markup-compatibility/2006" xmlns:p14="http://schemas.microsoft.com/office/powerpoint/2010/main">
+    <mc:Choice Requires="p14">
       <p:transition spd="med" p14:dur="700">
         <p:fade/>
       </p:transition>
     </mc:Choice>
-    <mc:Fallback>
+    <mc:Fallback xmlns="">
       <p:transition xmlns:p14="http://schemas.microsoft.com/office/powerpoint/2010/main" spd="med">
         <p:fade/>
       </p:transition>
@@ -1171,7 +1174,7 @@
           <a:p>
             <a:fld id="{45D31D1E-8B15-424E-B9F5-7F0A0D32F3D2}" type="datetime1">
               <a:rPr lang="en-US" smtClean="0"/>
-              <a:t>4/4/11</a:t>
+              <a:t>4/5/11</a:t>
             </a:fld>
             <a:endParaRPr lang="en-US"/>
           </a:p>
@@ -1233,13 +1236,13 @@
   <p:clrMapOvr>
     <a:masterClrMapping/>
   </p:clrMapOvr>
-  <mc:AlternateContent xmlns:mc="http://schemas.openxmlformats.org/markup-compatibility/2006">
-    <mc:Choice xmlns:p14="http://schemas.microsoft.com/office/powerpoint/2010/main" Requires="p14">
+  <mc:AlternateContent xmlns:mc="http://schemas.openxmlformats.org/markup-compatibility/2006" xmlns:p14="http://schemas.microsoft.com/office/powerpoint/2010/main">
+    <mc:Choice Requires="p14">
       <p:transition spd="med" p14:dur="700">
         <p:fade/>
       </p:transition>
     </mc:Choice>
-    <mc:Fallback>
+    <mc:Fallback xmlns="">
       <p:transition xmlns:p14="http://schemas.microsoft.com/office/powerpoint/2010/main" spd="med">
         <p:fade/>
       </p:transition>
@@ -1367,7 +1370,7 @@
           <a:p>
             <a:fld id="{2AB0BED3-B428-EA4D-8118-25C2BF4BB076}" type="datetime1">
               <a:rPr lang="en-US" smtClean="0"/>
-              <a:t>4/4/11</a:t>
+              <a:t>4/5/11</a:t>
             </a:fld>
             <a:endParaRPr lang="en-US"/>
           </a:p>
@@ -1429,13 +1432,13 @@
   <p:clrMapOvr>
     <a:masterClrMapping/>
   </p:clrMapOvr>
-  <mc:AlternateContent xmlns:mc="http://schemas.openxmlformats.org/markup-compatibility/2006">
-    <mc:Choice xmlns:p14="http://schemas.microsoft.com/office/powerpoint/2010/main" Requires="p14">
+  <mc:AlternateContent xmlns:mc="http://schemas.openxmlformats.org/markup-compatibility/2006" xmlns:p14="http://schemas.microsoft.com/office/powerpoint/2010/main">
+    <mc:Choice Requires="p14">
       <p:transition spd="med" p14:dur="700">
         <p:fade/>
       </p:transition>
     </mc:Choice>
-    <mc:Fallback>
+    <mc:Fallback xmlns="">
       <p:transition xmlns:p14="http://schemas.microsoft.com/office/powerpoint/2010/main" spd="med">
         <p:fade/>
       </p:transition>
@@ -1553,7 +1556,7 @@
           <a:p>
             <a:fld id="{8CF45696-DFBC-4542-BA95-08E16CFF7733}" type="datetime1">
               <a:rPr lang="en-US" smtClean="0"/>
-              <a:t>4/4/11</a:t>
+              <a:t>4/5/11</a:t>
             </a:fld>
             <a:endParaRPr lang="en-US"/>
           </a:p>
@@ -1615,13 +1618,13 @@
   <p:clrMapOvr>
     <a:masterClrMapping/>
   </p:clrMapOvr>
-  <mc:AlternateContent xmlns:mc="http://schemas.openxmlformats.org/markup-compatibility/2006">
-    <mc:Choice xmlns:p14="http://schemas.microsoft.com/office/powerpoint/2010/main" Requires="p14">
+  <mc:AlternateContent xmlns:mc="http://schemas.openxmlformats.org/markup-compatibility/2006" xmlns:p14="http://schemas.microsoft.com/office/powerpoint/2010/main">
+    <mc:Choice Requires="p14">
       <p:transition spd="med" p14:dur="700">
         <p:fade/>
       </p:transition>
     </mc:Choice>
-    <mc:Fallback>
+    <mc:Fallback xmlns="">
       <p:transition xmlns:p14="http://schemas.microsoft.com/office/powerpoint/2010/main" spd="med">
         <p:fade/>
       </p:transition>
@@ -1815,7 +1818,7 @@
           <a:p>
             <a:fld id="{A9562A25-AE39-1040-9393-00CE83728ECC}" type="datetime1">
               <a:rPr lang="en-US" smtClean="0"/>
-              <a:t>4/4/11</a:t>
+              <a:t>4/5/11</a:t>
             </a:fld>
             <a:endParaRPr lang="en-US"/>
           </a:p>
@@ -1877,13 +1880,13 @@
   <p:clrMapOvr>
     <a:masterClrMapping/>
   </p:clrMapOvr>
-  <mc:AlternateContent xmlns:mc="http://schemas.openxmlformats.org/markup-compatibility/2006">
-    <mc:Choice xmlns:p14="http://schemas.microsoft.com/office/powerpoint/2010/main" Requires="p14">
+  <mc:AlternateContent xmlns:mc="http://schemas.openxmlformats.org/markup-compatibility/2006" xmlns:p14="http://schemas.microsoft.com/office/powerpoint/2010/main">
+    <mc:Choice Requires="p14">
       <p:transition spd="med" p14:dur="700">
         <p:fade/>
       </p:transition>
     </mc:Choice>
-    <mc:Fallback>
+    <mc:Fallback xmlns="">
       <p:transition xmlns:p14="http://schemas.microsoft.com/office/powerpoint/2010/main" spd="med">
         <p:fade/>
       </p:transition>
@@ -2119,7 +2122,7 @@
           <a:p>
             <a:fld id="{0D23E481-CC56-1348-862A-FAF901A9088C}" type="datetime1">
               <a:rPr lang="en-US" smtClean="0"/>
-              <a:t>4/4/11</a:t>
+              <a:t>4/5/11</a:t>
             </a:fld>
             <a:endParaRPr lang="en-US"/>
           </a:p>
@@ -2181,13 +2184,13 @@
   <p:clrMapOvr>
     <a:masterClrMapping/>
   </p:clrMapOvr>
-  <mc:AlternateContent xmlns:mc="http://schemas.openxmlformats.org/markup-compatibility/2006">
-    <mc:Choice xmlns:p14="http://schemas.microsoft.com/office/powerpoint/2010/main" Requires="p14">
+  <mc:AlternateContent xmlns:mc="http://schemas.openxmlformats.org/markup-compatibility/2006" xmlns:p14="http://schemas.microsoft.com/office/powerpoint/2010/main">
+    <mc:Choice Requires="p14">
       <p:transition spd="med" p14:dur="700">
         <p:fade/>
       </p:transition>
     </mc:Choice>
-    <mc:Fallback>
+    <mc:Fallback xmlns="">
       <p:transition xmlns:p14="http://schemas.microsoft.com/office/powerpoint/2010/main" spd="med">
         <p:fade/>
       </p:transition>
@@ -2557,7 +2560,7 @@
           <a:p>
             <a:fld id="{B5A75268-E0C8-994D-B737-210AAD234637}" type="datetime1">
               <a:rPr lang="en-US" smtClean="0"/>
-              <a:t>4/4/11</a:t>
+              <a:t>4/5/11</a:t>
             </a:fld>
             <a:endParaRPr lang="en-US"/>
           </a:p>
@@ -2619,13 +2622,13 @@
   <p:clrMapOvr>
     <a:masterClrMapping/>
   </p:clrMapOvr>
-  <mc:AlternateContent xmlns:mc="http://schemas.openxmlformats.org/markup-compatibility/2006">
-    <mc:Choice xmlns:p14="http://schemas.microsoft.com/office/powerpoint/2010/main" Requires="p14">
+  <mc:AlternateContent xmlns:mc="http://schemas.openxmlformats.org/markup-compatibility/2006" xmlns:p14="http://schemas.microsoft.com/office/powerpoint/2010/main">
+    <mc:Choice Requires="p14">
       <p:transition spd="med" p14:dur="700">
         <p:fade/>
       </p:transition>
     </mc:Choice>
-    <mc:Fallback>
+    <mc:Fallback xmlns="">
       <p:transition xmlns:p14="http://schemas.microsoft.com/office/powerpoint/2010/main" spd="med">
         <p:fade/>
       </p:transition>
@@ -2691,7 +2694,7 @@
           <a:p>
             <a:fld id="{7BEA253F-6AEE-2543-97F5-5B75F539F4EA}" type="datetime1">
               <a:rPr lang="en-US" smtClean="0"/>
-              <a:t>4/4/11</a:t>
+              <a:t>4/5/11</a:t>
             </a:fld>
             <a:endParaRPr lang="en-US"/>
           </a:p>
@@ -2753,13 +2756,13 @@
   <p:clrMapOvr>
     <a:masterClrMapping/>
   </p:clrMapOvr>
-  <mc:AlternateContent xmlns:mc="http://schemas.openxmlformats.org/markup-compatibility/2006">
-    <mc:Choice xmlns:p14="http://schemas.microsoft.com/office/powerpoint/2010/main" Requires="p14">
+  <mc:AlternateContent xmlns:mc="http://schemas.openxmlformats.org/markup-compatibility/2006" xmlns:p14="http://schemas.microsoft.com/office/powerpoint/2010/main">
+    <mc:Choice Requires="p14">
       <p:transition spd="med" p14:dur="700">
         <p:fade/>
       </p:transition>
     </mc:Choice>
-    <mc:Fallback>
+    <mc:Fallback xmlns="">
       <p:transition xmlns:p14="http://schemas.microsoft.com/office/powerpoint/2010/main" spd="med">
         <p:fade/>
       </p:transition>
@@ -2802,7 +2805,7 @@
           <a:p>
             <a:fld id="{431E3F01-5D57-4147-A951-670A243029E2}" type="datetime1">
               <a:rPr lang="en-US" smtClean="0"/>
-              <a:t>4/4/11</a:t>
+              <a:t>4/5/11</a:t>
             </a:fld>
             <a:endParaRPr lang="en-US"/>
           </a:p>
@@ -2864,13 +2867,13 @@
   <p:clrMapOvr>
     <a:masterClrMapping/>
   </p:clrMapOvr>
-  <mc:AlternateContent xmlns:mc="http://schemas.openxmlformats.org/markup-compatibility/2006">
-    <mc:Choice xmlns:p14="http://schemas.microsoft.com/office/powerpoint/2010/main" Requires="p14">
+  <mc:AlternateContent xmlns:mc="http://schemas.openxmlformats.org/markup-compatibility/2006" xmlns:p14="http://schemas.microsoft.com/office/powerpoint/2010/main">
+    <mc:Choice Requires="p14">
       <p:transition spd="med" p14:dur="700">
         <p:fade/>
       </p:transition>
     </mc:Choice>
-    <mc:Fallback>
+    <mc:Fallback xmlns="">
       <p:transition xmlns:p14="http://schemas.microsoft.com/office/powerpoint/2010/main" spd="med">
         <p:fade/>
       </p:transition>
@@ -3095,7 +3098,7 @@
           <a:p>
             <a:fld id="{6AA85813-6D36-CB4C-A1AB-7DCCA9094F46}" type="datetime1">
               <a:rPr lang="en-US" smtClean="0"/>
-              <a:t>4/4/11</a:t>
+              <a:t>4/5/11</a:t>
             </a:fld>
             <a:endParaRPr lang="en-US"/>
           </a:p>
@@ -3157,13 +3160,13 @@
   <p:clrMapOvr>
     <a:masterClrMapping/>
   </p:clrMapOvr>
-  <mc:AlternateContent xmlns:mc="http://schemas.openxmlformats.org/markup-compatibility/2006">
-    <mc:Choice xmlns:p14="http://schemas.microsoft.com/office/powerpoint/2010/main" Requires="p14">
+  <mc:AlternateContent xmlns:mc="http://schemas.openxmlformats.org/markup-compatibility/2006" xmlns:p14="http://schemas.microsoft.com/office/powerpoint/2010/main">
+    <mc:Choice Requires="p14">
       <p:transition spd="med" p14:dur="700">
         <p:fade/>
       </p:transition>
     </mc:Choice>
-    <mc:Fallback>
+    <mc:Fallback xmlns="">
       <p:transition xmlns:p14="http://schemas.microsoft.com/office/powerpoint/2010/main" spd="med">
         <p:fade/>
       </p:transition>
@@ -3368,7 +3371,7 @@
           <a:p>
             <a:fld id="{9CABFF7A-9352-E041-A406-13A058739E02}" type="datetime1">
               <a:rPr lang="en-US" smtClean="0"/>
-              <a:t>4/4/11</a:t>
+              <a:t>4/5/11</a:t>
             </a:fld>
             <a:endParaRPr lang="en-US"/>
           </a:p>
@@ -3430,13 +3433,13 @@
   <p:clrMapOvr>
     <a:masterClrMapping/>
   </p:clrMapOvr>
-  <mc:AlternateContent xmlns:mc="http://schemas.openxmlformats.org/markup-compatibility/2006">
-    <mc:Choice xmlns:p14="http://schemas.microsoft.com/office/powerpoint/2010/main" Requires="p14">
+  <mc:AlternateContent xmlns:mc="http://schemas.openxmlformats.org/markup-compatibility/2006" xmlns:p14="http://schemas.microsoft.com/office/powerpoint/2010/main">
+    <mc:Choice Requires="p14">
       <p:transition spd="med" p14:dur="700">
         <p:fade/>
       </p:transition>
     </mc:Choice>
-    <mc:Fallback>
+    <mc:Fallback xmlns="">
       <p:transition xmlns:p14="http://schemas.microsoft.com/office/powerpoint/2010/main" spd="med">
         <p:fade/>
       </p:transition>
@@ -3597,7 +3600,7 @@
           <a:p>
             <a:fld id="{8720FB2C-4FAB-884A-86FE-A9A4C6176AFC}" type="datetime1">
               <a:rPr lang="en-US" smtClean="0"/>
-              <a:t>4/4/11</a:t>
+              <a:t>4/5/11</a:t>
             </a:fld>
             <a:endParaRPr lang="en-US"/>
           </a:p>
@@ -3706,13 +3709,13 @@
     <p:sldLayoutId id="2147483658" r:id="rId10"/>
     <p:sldLayoutId id="2147483659" r:id="rId11"/>
   </p:sldLayoutIdLst>
-  <mc:AlternateContent xmlns:mc="http://schemas.openxmlformats.org/markup-compatibility/2006">
-    <mc:Choice xmlns:p14="http://schemas.microsoft.com/office/powerpoint/2010/main" Requires="p14">
+  <mc:AlternateContent xmlns:mc="http://schemas.openxmlformats.org/markup-compatibility/2006" xmlns:p14="http://schemas.microsoft.com/office/powerpoint/2010/main">
+    <mc:Choice Requires="p14">
       <p:transition spd="med" p14:dur="700">
         <p:fade/>
       </p:transition>
     </mc:Choice>
-    <mc:Fallback>
+    <mc:Fallback xmlns="">
       <p:transition xmlns:p14="http://schemas.microsoft.com/office/powerpoint/2010/main" spd="med">
         <p:fade/>
       </p:transition>
@@ -4001,19 +4004,21 @@
         </p:nvSpPr>
         <p:spPr>
           <a:xfrm>
-            <a:off x="685800" y="1552681"/>
+            <a:off x="776484" y="2149021"/>
             <a:ext cx="7772400" cy="1470025"/>
           </a:xfrm>
         </p:spPr>
         <p:txBody>
-          <a:bodyPr/>
-          <a:lstStyle/>
-          <a:p>
-            <a:r>
-              <a:rPr lang="en-US" dirty="0" err="1" smtClean="0"/>
+          <a:bodyPr>
+            <a:normAutofit/>
+          </a:bodyPr>
+          <a:lstStyle/>
+          <a:p>
+            <a:r>
+              <a:rPr lang="en-US" sz="5400" dirty="0" err="1" smtClean="0"/>
               <a:t>CourseOverflow</a:t>
             </a:r>
-            <a:endParaRPr lang="en-US" dirty="0"/>
+            <a:endParaRPr lang="en-US" sz="5400" dirty="0"/>
           </a:p>
         </p:txBody>
       </p:sp>
@@ -4029,17 +4034,229 @@
         </p:nvSpPr>
         <p:spPr>
           <a:xfrm>
-            <a:off x="1365914" y="3156522"/>
+            <a:off x="1418813" y="4970209"/>
             <a:ext cx="6400800" cy="1752600"/>
           </a:xfrm>
         </p:spPr>
         <p:txBody>
-          <a:bodyPr/>
+          <a:bodyPr>
+            <a:normAutofit/>
+          </a:bodyPr>
+          <a:lstStyle/>
+          <a:p>
+            <a:r>
+              <a:rPr lang="en-US" sz="2000" dirty="0" smtClean="0"/>
+              <a:t>Bryan Mishkin</a:t>
+            </a:r>
+          </a:p>
+          <a:p>
+            <a:r>
+              <a:rPr lang="en-US" sz="2000" dirty="0" smtClean="0"/>
+              <a:t>Joseph </a:t>
+            </a:r>
+            <a:r>
+              <a:rPr lang="en-US" sz="2000" dirty="0" err="1" smtClean="0"/>
+              <a:t>Kaczmarek</a:t>
+            </a:r>
+            <a:endParaRPr lang="en-US" sz="2000" dirty="0" smtClean="0"/>
+          </a:p>
+          <a:p>
+            <a:r>
+              <a:rPr lang="en-US" sz="2000" dirty="0" err="1" smtClean="0"/>
+              <a:t>Kiran</a:t>
+            </a:r>
+            <a:r>
+              <a:rPr lang="en-US" sz="2000" dirty="0" smtClean="0"/>
+              <a:t> </a:t>
+            </a:r>
+            <a:r>
+              <a:rPr lang="en-US" sz="2000" dirty="0" err="1" smtClean="0"/>
+              <a:t>Ryali</a:t>
+            </a:r>
+            <a:endParaRPr lang="en-US" sz="2000" dirty="0"/>
+          </a:p>
+        </p:txBody>
+      </p:sp>
+      <p:sp>
+        <p:nvSpPr>
+          <p:cNvPr id="10" name="TextBox 9"/>
+          <p:cNvSpPr txBox="1"/>
+          <p:nvPr/>
+        </p:nvSpPr>
+        <p:spPr>
+          <a:xfrm>
+            <a:off x="221568" y="180013"/>
+            <a:ext cx="4168552" cy="646331"/>
+          </a:xfrm>
+          <a:prstGeom prst="rect">
+            <a:avLst/>
+          </a:prstGeom>
+          <a:noFill/>
+        </p:spPr>
+        <p:txBody>
+          <a:bodyPr wrap="square" rtlCol="0">
+            <a:spAutoFit/>
+          </a:bodyPr>
           <a:lstStyle/>
           <a:p>
             <a:r>
               <a:rPr lang="en-US" dirty="0" smtClean="0"/>
-              <a:t>Bryan Mishkin</a:t>
+              <a:t>Computing Habitat Programming Competition 2011</a:t>
+            </a:r>
+            <a:endParaRPr lang="en-US" dirty="0"/>
+          </a:p>
+        </p:txBody>
+      </p:sp>
+      <p:sp>
+        <p:nvSpPr>
+          <p:cNvPr id="4" name="TextBox 3"/>
+          <p:cNvSpPr txBox="1"/>
+          <p:nvPr/>
+        </p:nvSpPr>
+        <p:spPr>
+          <a:xfrm>
+            <a:off x="4972010" y="3113494"/>
+            <a:ext cx="2055627" cy="369332"/>
+          </a:xfrm>
+          <a:prstGeom prst="rect">
+            <a:avLst/>
+          </a:prstGeom>
+          <a:noFill/>
+        </p:spPr>
+        <p:txBody>
+          <a:bodyPr wrap="none" rtlCol="0">
+            <a:spAutoFit/>
+          </a:bodyPr>
+          <a:lstStyle/>
+          <a:p>
+            <a:r>
+              <a:rPr lang="en-US" dirty="0" smtClean="0"/>
+              <a:t>Better collaboration</a:t>
+            </a:r>
+            <a:endParaRPr lang="en-US" dirty="0"/>
+          </a:p>
+        </p:txBody>
+      </p:sp>
+    </p:spTree>
+    <p:extLst>
+      <p:ext uri="{BB962C8B-B14F-4D97-AF65-F5344CB8AC3E}">
+        <p14:creationId xmlns:p14="http://schemas.microsoft.com/office/powerpoint/2010/main" val="1460728908"/>
+      </p:ext>
+    </p:extLst>
+  </p:cSld>
+  <p:clrMapOvr>
+    <a:masterClrMapping/>
+  </p:clrMapOvr>
+  <mc:AlternateContent xmlns:mc="http://schemas.openxmlformats.org/markup-compatibility/2006" xmlns:p14="http://schemas.microsoft.com/office/powerpoint/2010/main">
+    <mc:Choice Requires="p14">
+      <p:transition spd="med" p14:dur="700">
+        <p:fade/>
+      </p:transition>
+    </mc:Choice>
+    <mc:Fallback xmlns="">
+      <p:transition xmlns:p14="http://schemas.microsoft.com/office/powerpoint/2010/main" spd="med">
+        <p:fade/>
+      </p:transition>
+    </mc:Fallback>
+  </mc:AlternateContent>
+  <p:timing>
+    <p:tnLst>
+      <p:par>
+        <p:cTn xmlns:p14="http://schemas.microsoft.com/office/powerpoint/2010/main" id="1" dur="indefinite" restart="never" nodeType="tmRoot"/>
+      </p:par>
+    </p:tnLst>
+  </p:timing>
+</p:sld>
+</file>
+
+<file path=ppt/slides/slide10.xml><?xml version="1.0" encoding="utf-8"?>
+<p:sld xmlns:a="http://schemas.openxmlformats.org/drawingml/2006/main" xmlns:r="http://schemas.openxmlformats.org/officeDocument/2006/relationships" xmlns:p="http://schemas.openxmlformats.org/presentationml/2006/main">
+  <p:cSld>
+    <p:spTree>
+      <p:nvGrpSpPr>
+        <p:cNvPr id="1" name=""/>
+        <p:cNvGrpSpPr/>
+        <p:nvPr/>
+      </p:nvGrpSpPr>
+      <p:grpSpPr>
+        <a:xfrm>
+          <a:off x="0" y="0"/>
+          <a:ext cx="0" cy="0"/>
+          <a:chOff x="0" y="0"/>
+          <a:chExt cx="0" cy="0"/>
+        </a:xfrm>
+      </p:grpSpPr>
+      <p:sp>
+        <p:nvSpPr>
+          <p:cNvPr id="2" name="Title 1"/>
+          <p:cNvSpPr>
+            <a:spLocks noGrp="1"/>
+          </p:cNvSpPr>
+          <p:nvPr>
+            <p:ph type="title"/>
+          </p:nvPr>
+        </p:nvSpPr>
+        <p:spPr/>
+        <p:txBody>
+          <a:bodyPr/>
+          <a:lstStyle/>
+          <a:p>
+            <a:r>
+              <a:rPr lang="en-US" dirty="0" smtClean="0"/>
+              <a:t>Thanks + Questions</a:t>
+            </a:r>
+            <a:endParaRPr lang="en-US" dirty="0"/>
+          </a:p>
+        </p:txBody>
+      </p:sp>
+      <p:sp>
+        <p:nvSpPr>
+          <p:cNvPr id="4" name="Footer Placeholder 3"/>
+          <p:cNvSpPr>
+            <a:spLocks noGrp="1"/>
+          </p:cNvSpPr>
+          <p:nvPr>
+            <p:ph type="ftr" sz="quarter" idx="11"/>
+          </p:nvPr>
+        </p:nvSpPr>
+        <p:spPr/>
+        <p:txBody>
+          <a:bodyPr/>
+          <a:lstStyle/>
+          <a:p>
+            <a:r>
+              <a:rPr lang="en-US" dirty="0" smtClean="0"/>
+              <a:t>Computing Habitat Programming Competition 2011</a:t>
+            </a:r>
+          </a:p>
+          <a:p>
+            <a:endParaRPr lang="en-US" dirty="0"/>
+          </a:p>
+        </p:txBody>
+      </p:sp>
+      <p:sp>
+        <p:nvSpPr>
+          <p:cNvPr id="5" name="Slide Number Placeholder 4"/>
+          <p:cNvSpPr>
+            <a:spLocks noGrp="1"/>
+          </p:cNvSpPr>
+          <p:nvPr>
+            <p:ph type="sldNum" sz="quarter" idx="12"/>
+          </p:nvPr>
+        </p:nvSpPr>
+        <p:spPr>
+          <a:xfrm>
+            <a:off x="6260171" y="6259810"/>
+            <a:ext cx="2426629" cy="365125"/>
+          </a:xfrm>
+        </p:spPr>
+        <p:txBody>
+          <a:bodyPr/>
+          <a:lstStyle/>
+          <a:p>
+            <a:r>
+              <a:rPr lang="en-US" dirty="0" smtClean="0"/>
+              <a:t>Bryan Mishkin (bmishk2)</a:t>
             </a:r>
           </a:p>
           <a:p>
@@ -4051,7 +4268,10 @@
               <a:rPr lang="en-US" dirty="0" err="1" smtClean="0"/>
               <a:t>Kaczmarek</a:t>
             </a:r>
-            <a:endParaRPr lang="en-US" dirty="0" smtClean="0"/>
+            <a:r>
+              <a:rPr lang="en-US" dirty="0" smtClean="0"/>
+              <a:t> (jkaczma2)</a:t>
+            </a:r>
           </a:p>
           <a:p>
             <a:r>
@@ -4066,20 +4286,54 @@
               <a:rPr lang="en-US" dirty="0" err="1" smtClean="0"/>
               <a:t>Ryali</a:t>
             </a:r>
+            <a:r>
+              <a:rPr lang="en-US" dirty="0" smtClean="0"/>
+              <a:t> (ryali1) </a:t>
+            </a:r>
             <a:endParaRPr lang="en-US" dirty="0"/>
+          </a:p>
+        </p:txBody>
+      </p:sp>
+      <p:sp>
+        <p:nvSpPr>
+          <p:cNvPr id="6" name="TextBox 5"/>
+          <p:cNvSpPr txBox="1"/>
+          <p:nvPr/>
+        </p:nvSpPr>
+        <p:spPr>
+          <a:xfrm>
+            <a:off x="290008" y="6259810"/>
+            <a:ext cx="2070057" cy="461665"/>
+          </a:xfrm>
+          <a:prstGeom prst="rect">
+            <a:avLst/>
+          </a:prstGeom>
+          <a:noFill/>
+        </p:spPr>
+        <p:txBody>
+          <a:bodyPr wrap="square" rtlCol="0">
+            <a:spAutoFit/>
+          </a:bodyPr>
+          <a:lstStyle/>
+          <a:p>
+            <a:r>
+              <a:rPr lang="en-US" sz="1200" dirty="0" smtClean="0"/>
+              <a:t>University of Illinois at Urbana-Champaign</a:t>
+            </a:r>
+            <a:endParaRPr lang="en-US" sz="1200" dirty="0"/>
           </a:p>
         </p:txBody>
       </p:sp>
       <p:pic>
         <p:nvPicPr>
-          <p:cNvPr id="5" name="Picture 4" descr="stackoverflow-logo-250.png"/>
+          <p:cNvPr id="8" name="Picture 7" descr="Screen shot 2011-04-04 at 6.21.18 PM.png"/>
           <p:cNvPicPr>
             <a:picLocks noChangeAspect="1"/>
           </p:cNvPicPr>
           <p:nvPr/>
         </p:nvPicPr>
         <p:blipFill>
-          <a:blip r:embed="rId3">
+          <a:blip r:embed="rId2">
             <a:extLst>
               <a:ext uri="{28A0092B-C50C-407E-A947-70E740481C1C}">
                 <a14:useLocalDpi xmlns:a14="http://schemas.microsoft.com/office/drawing/2010/main" val="0"/>
@@ -4092,181 +4346,61 @@
         </p:blipFill>
         <p:spPr>
           <a:xfrm>
-            <a:off x="2540070" y="5750419"/>
-            <a:ext cx="3175000" cy="889000"/>
+            <a:off x="370010" y="1593826"/>
+            <a:ext cx="5094137" cy="2942221"/>
           </a:xfrm>
           <a:prstGeom prst="rect">
             <a:avLst/>
           </a:prstGeom>
         </p:spPr>
       </p:pic>
-      <p:sp>
-        <p:nvSpPr>
-          <p:cNvPr id="6" name="TextBox 5"/>
-          <p:cNvSpPr txBox="1"/>
-          <p:nvPr/>
-        </p:nvSpPr>
-        <p:spPr>
-          <a:xfrm>
-            <a:off x="240006" y="5987018"/>
-            <a:ext cx="2300064" cy="369332"/>
-          </a:xfrm>
-          <a:prstGeom prst="rect">
-            <a:avLst/>
-          </a:prstGeom>
-          <a:noFill/>
-        </p:spPr>
-        <p:txBody>
-          <a:bodyPr wrap="square" rtlCol="0">
-            <a:spAutoFit/>
-          </a:bodyPr>
-          <a:lstStyle/>
-          <a:p>
-            <a:r>
-              <a:rPr lang="en-US" dirty="0" smtClean="0"/>
-              <a:t>With influence from </a:t>
-            </a:r>
-            <a:endParaRPr lang="en-US" dirty="0"/>
-          </a:p>
-        </p:txBody>
-      </p:sp>
-      <p:sp>
-        <p:nvSpPr>
-          <p:cNvPr id="7" name="TextBox 6"/>
-          <p:cNvSpPr txBox="1"/>
-          <p:nvPr/>
-        </p:nvSpPr>
-        <p:spPr>
-          <a:xfrm>
-            <a:off x="5956665" y="5987018"/>
-            <a:ext cx="1620044" cy="369332"/>
-          </a:xfrm>
-          <a:prstGeom prst="rect">
-            <a:avLst/>
-          </a:prstGeom>
-          <a:noFill/>
-        </p:spPr>
-        <p:txBody>
-          <a:bodyPr wrap="square" rtlCol="0">
-            <a:spAutoFit/>
-          </a:bodyPr>
-          <a:lstStyle/>
-          <a:p>
-            <a:r>
-              <a:rPr lang="en-US" dirty="0" smtClean="0"/>
-              <a:t>and</a:t>
-            </a:r>
-            <a:endParaRPr lang="en-US" dirty="0"/>
-          </a:p>
-        </p:txBody>
-      </p:sp>
       <p:pic>
         <p:nvPicPr>
-          <p:cNvPr id="8" name="Picture 7" descr="30b563f81d9dbd9bd6833c778e57fef3.jpeg"/>
+          <p:cNvPr id="7" name="Content Placeholder 6" descr="Screen shot 2011-04-04 at 6.28.00 PM.png"/>
           <p:cNvPicPr>
-            <a:picLocks noChangeAspect="1"/>
+            <a:picLocks noGrp="1" noChangeAspect="1"/>
           </p:cNvPicPr>
-          <p:nvPr/>
+          <p:nvPr>
+            <p:ph idx="1"/>
+          </p:nvPr>
         </p:nvPicPr>
         <p:blipFill>
-          <a:blip r:embed="rId4">
+          <a:blip r:embed="rId3">
             <a:extLst>
               <a:ext uri="{28A0092B-C50C-407E-A947-70E740481C1C}">
                 <a14:useLocalDpi xmlns:a14="http://schemas.microsoft.com/office/drawing/2010/main" val="0"/>
               </a:ext>
             </a:extLst>
           </a:blip>
+          <a:srcRect t="12431" b="12431"/>
           <a:stretch>
             <a:fillRect/>
           </a:stretch>
         </p:blipFill>
         <p:spPr>
           <a:xfrm>
-            <a:off x="6766687" y="5750420"/>
-            <a:ext cx="889000" cy="889000"/>
+            <a:off x="3012018" y="2544108"/>
+            <a:ext cx="5793040" cy="3185949"/>
           </a:xfrm>
-          <a:prstGeom prst="rect">
-            <a:avLst/>
-          </a:prstGeom>
         </p:spPr>
       </p:pic>
-      <p:sp>
-        <p:nvSpPr>
-          <p:cNvPr id="10" name="TextBox 9"/>
-          <p:cNvSpPr txBox="1"/>
-          <p:nvPr/>
-        </p:nvSpPr>
-        <p:spPr>
-          <a:xfrm>
-            <a:off x="221568" y="180013"/>
-            <a:ext cx="4168552" cy="646331"/>
-          </a:xfrm>
-          <a:prstGeom prst="rect">
-            <a:avLst/>
-          </a:prstGeom>
-          <a:noFill/>
-        </p:spPr>
-        <p:txBody>
-          <a:bodyPr wrap="square" rtlCol="0">
-            <a:spAutoFit/>
-          </a:bodyPr>
-          <a:lstStyle/>
-          <a:p>
-            <a:r>
-              <a:rPr lang="en-US" dirty="0" smtClean="0"/>
-              <a:t>Computing Habitat Programming Competition 2011</a:t>
-            </a:r>
-            <a:endParaRPr lang="en-US" dirty="0"/>
-          </a:p>
-        </p:txBody>
-      </p:sp>
-      <p:sp>
-        <p:nvSpPr>
-          <p:cNvPr id="11" name="TextBox 10"/>
-          <p:cNvSpPr txBox="1"/>
-          <p:nvPr/>
-        </p:nvSpPr>
-        <p:spPr>
-          <a:xfrm>
-            <a:off x="221568" y="906350"/>
-            <a:ext cx="2780076" cy="646331"/>
-          </a:xfrm>
-          <a:prstGeom prst="rect">
-            <a:avLst/>
-          </a:prstGeom>
-          <a:noFill/>
-        </p:spPr>
-        <p:txBody>
-          <a:bodyPr wrap="square" rtlCol="0">
-            <a:spAutoFit/>
-          </a:bodyPr>
-          <a:lstStyle/>
-          <a:p>
-            <a:r>
-              <a:rPr lang="en-US" dirty="0" smtClean="0"/>
-              <a:t>University of Illinois at Urbana-Champaign</a:t>
-            </a:r>
-            <a:endParaRPr lang="en-US" dirty="0"/>
-          </a:p>
-        </p:txBody>
-      </p:sp>
     </p:spTree>
     <p:extLst>
       <p:ext uri="{BB962C8B-B14F-4D97-AF65-F5344CB8AC3E}">
-        <p14:creationId xmlns:p14="http://schemas.microsoft.com/office/powerpoint/2010/main" val="1460728908"/>
+        <p14:creationId xmlns:p14="http://schemas.microsoft.com/office/powerpoint/2010/main" val="1638797427"/>
       </p:ext>
     </p:extLst>
   </p:cSld>
   <p:clrMapOvr>
     <a:masterClrMapping/>
   </p:clrMapOvr>
-  <mc:AlternateContent xmlns:mc="http://schemas.openxmlformats.org/markup-compatibility/2006">
-    <mc:Choice xmlns:p14="http://schemas.microsoft.com/office/powerpoint/2010/main" Requires="p14">
+  <mc:AlternateContent xmlns:mc="http://schemas.openxmlformats.org/markup-compatibility/2006" xmlns:p14="http://schemas.microsoft.com/office/powerpoint/2010/main">
+    <mc:Choice Requires="p14">
       <p:transition spd="med" p14:dur="700">
         <p:fade/>
       </p:transition>
     </mc:Choice>
-    <mc:Fallback>
+    <mc:Fallback xmlns="">
       <p:transition xmlns:p14="http://schemas.microsoft.com/office/powerpoint/2010/main" spd="med">
         <p:fade/>
       </p:transition>
@@ -4316,7 +4450,7 @@
           <a:p>
             <a:r>
               <a:rPr lang="en-US" dirty="0" smtClean="0"/>
-              <a:t>The CS Newsgroups</a:t>
+              <a:t>Existing Class Newsgroups</a:t>
             </a:r>
             <a:endParaRPr lang="en-US" dirty="0"/>
           </a:p>
@@ -4424,7 +4558,7 @@
             </a:fld>
             <a:r>
               <a:rPr lang="en-US" dirty="0" smtClean="0"/>
-              <a:t>/7</a:t>
+              <a:t>/10</a:t>
             </a:r>
             <a:endParaRPr lang="en-US" dirty="0"/>
           </a:p>
@@ -4469,7 +4603,7 @@
           <p:nvPr/>
         </p:nvPicPr>
         <p:blipFill>
-          <a:blip r:embed="rId4">
+          <a:blip r:embed="rId4" cstate="email">
             <a:extLst>
               <a:ext uri="{28A0092B-C50C-407E-A947-70E740481C1C}">
                 <a14:useLocalDpi xmlns:a14="http://schemas.microsoft.com/office/drawing/2010/main" val="0"/>
@@ -4535,13 +4669,13 @@
   <p:clrMapOvr>
     <a:masterClrMapping/>
   </p:clrMapOvr>
-  <mc:AlternateContent xmlns:mc="http://schemas.openxmlformats.org/markup-compatibility/2006">
-    <mc:Choice xmlns:p14="http://schemas.microsoft.com/office/powerpoint/2010/main" Requires="p14">
+  <mc:AlternateContent xmlns:mc="http://schemas.openxmlformats.org/markup-compatibility/2006" xmlns:p14="http://schemas.microsoft.com/office/powerpoint/2010/main">
+    <mc:Choice Requires="p14">
       <p:transition spd="med" p14:dur="700">
         <p:fade/>
       </p:transition>
     </mc:Choice>
-    <mc:Fallback>
+    <mc:Fallback xmlns="">
       <p:transition xmlns:p14="http://schemas.microsoft.com/office/powerpoint/2010/main" spd="med">
         <p:fade/>
       </p:transition>
@@ -4591,7 +4725,7 @@
           <a:p>
             <a:r>
               <a:rPr lang="en-US" dirty="0" smtClean="0"/>
-              <a:t>Extending the newsgroups</a:t>
+              <a:t>Problems	</a:t>
             </a:r>
             <a:endParaRPr lang="en-US" dirty="0"/>
           </a:p>
@@ -4599,7 +4733,7 @@
       </p:sp>
       <p:sp>
         <p:nvSpPr>
-          <p:cNvPr id="5" name="Content Placeholder 4"/>
+          <p:cNvPr id="3" name="Content Placeholder 2"/>
           <p:cNvSpPr>
             <a:spLocks noGrp="1"/>
           </p:cNvSpPr>
@@ -4607,6 +4741,58 @@
             <p:ph idx="1"/>
           </p:nvPr>
         </p:nvSpPr>
+        <p:spPr>
+          <a:xfrm>
+            <a:off x="157523" y="1863044"/>
+            <a:ext cx="7418934" cy="4525963"/>
+          </a:xfrm>
+        </p:spPr>
+        <p:txBody>
+          <a:bodyPr/>
+          <a:lstStyle/>
+          <a:p>
+            <a:r>
+              <a:rPr lang="en-US" dirty="0" smtClean="0"/>
+              <a:t>Hard to find good answers</a:t>
+            </a:r>
+          </a:p>
+          <a:p>
+            <a:r>
+              <a:rPr lang="en-US" dirty="0" smtClean="0"/>
+              <a:t>Difficult to follow a thread</a:t>
+            </a:r>
+          </a:p>
+          <a:p>
+            <a:r>
+              <a:rPr lang="en-US" dirty="0" smtClean="0"/>
+              <a:t>No incentive to contribute</a:t>
+            </a:r>
+          </a:p>
+          <a:p>
+            <a:r>
+              <a:rPr lang="en-US" dirty="0" smtClean="0"/>
+              <a:t>Not knowing who to trust</a:t>
+            </a:r>
+          </a:p>
+          <a:p>
+            <a:r>
+              <a:rPr lang="en-US" dirty="0" smtClean="0"/>
+              <a:t>Stuck in the 80s</a:t>
+            </a:r>
+            <a:endParaRPr lang="en-US" dirty="0"/>
+          </a:p>
+        </p:txBody>
+      </p:sp>
+      <p:sp>
+        <p:nvSpPr>
+          <p:cNvPr id="4" name="Footer Placeholder 3"/>
+          <p:cNvSpPr>
+            <a:spLocks noGrp="1"/>
+          </p:cNvSpPr>
+          <p:nvPr>
+            <p:ph type="ftr" sz="quarter" idx="11"/>
+          </p:nvPr>
+        </p:nvSpPr>
         <p:spPr/>
         <p:txBody>
           <a:bodyPr/>
@@ -4614,28 +4800,15 @@
           <a:p>
             <a:r>
               <a:rPr lang="en-US" dirty="0" smtClean="0"/>
-              <a:t>We built an API that newsgroup readers can plug into for:</a:t>
-            </a:r>
-          </a:p>
-          <a:p>
-            <a:pPr lvl="1"/>
-            <a:r>
-              <a:rPr lang="en-US" dirty="0" smtClean="0"/>
-              <a:t>User reputations based on voting</a:t>
-            </a:r>
-          </a:p>
-          <a:p>
-            <a:pPr lvl="1"/>
-            <a:r>
-              <a:rPr lang="en-US" dirty="0" smtClean="0"/>
-              <a:t>Remembering what classes students are in</a:t>
-            </a:r>
-          </a:p>
-        </p:txBody>
-      </p:sp>
-      <p:sp>
-        <p:nvSpPr>
-          <p:cNvPr id="6" name="Slide Number Placeholder 5"/>
+              <a:t>Computing Habitat Programming Competition 2011</a:t>
+            </a:r>
+            <a:endParaRPr lang="en-US" dirty="0"/>
+          </a:p>
+        </p:txBody>
+      </p:sp>
+      <p:sp>
+        <p:nvSpPr>
+          <p:cNvPr id="5" name="Slide Number Placeholder 4"/>
           <p:cNvSpPr>
             <a:spLocks noGrp="1"/>
           </p:cNvSpPr>
@@ -4643,7 +4816,12 @@
             <p:ph type="sldNum" sz="quarter" idx="12"/>
           </p:nvPr>
         </p:nvSpPr>
-        <p:spPr/>
+        <p:spPr>
+          <a:xfrm>
+            <a:off x="6553200" y="6356350"/>
+            <a:ext cx="2133600" cy="365125"/>
+          </a:xfrm>
+        </p:spPr>
         <p:txBody>
           <a:bodyPr/>
           <a:lstStyle/>
@@ -4652,15 +4830,19 @@
               <a:rPr lang="en-US" smtClean="0"/>
               <a:t>3</a:t>
             </a:fld>
-            <a:endParaRPr lang="en-US"/>
+            <a:r>
+              <a:rPr lang="en-US" dirty="0" smtClean="0"/>
+              <a:t>/10</a:t>
+            </a:r>
+            <a:endParaRPr lang="en-US" dirty="0"/>
           </a:p>
         </p:txBody>
       </p:sp>
       <p:pic>
         <p:nvPicPr>
-          <p:cNvPr id="7" name="Picture 6" descr="Screen shot 2011-04-04 at 5.41.42 PM.png"/>
+          <p:cNvPr id="1027" name="Picture 3" descr="\\ad.uiuc.edu\engr\ews\ryali1\Desktop\Capture.PNG"/>
           <p:cNvPicPr>
-            <a:picLocks noChangeAspect="1"/>
+            <a:picLocks noChangeAspect="1" noChangeArrowheads="1"/>
           </p:cNvPicPr>
           <p:nvPr/>
         </p:nvPicPr>
@@ -4672,127 +4854,48 @@
               </a:ext>
             </a:extLst>
           </a:blip>
+          <a:srcRect/>
           <a:stretch>
             <a:fillRect/>
           </a:stretch>
         </p:blipFill>
-        <p:spPr>
+        <p:spPr bwMode="auto">
           <a:xfrm>
-            <a:off x="1444845" y="5017975"/>
-            <a:ext cx="825500" cy="635000"/>
+            <a:off x="5219613" y="1863044"/>
+            <a:ext cx="5486400" cy="3714750"/>
           </a:xfrm>
           <a:prstGeom prst="rect">
             <a:avLst/>
           </a:prstGeom>
-        </p:spPr>
-      </p:pic>
-      <p:pic>
-        <p:nvPicPr>
-          <p:cNvPr id="11" name="Picture 10" descr="Screen shot 2011-04-04 at 5.58.11 PM.png"/>
-          <p:cNvPicPr>
-            <a:picLocks noChangeAspect="1"/>
-          </p:cNvPicPr>
-          <p:nvPr/>
-        </p:nvPicPr>
-        <p:blipFill>
-          <a:blip r:embed="rId3">
-            <a:extLst>
-              <a:ext uri="{28A0092B-C50C-407E-A947-70E740481C1C}">
-                <a14:useLocalDpi xmlns:a14="http://schemas.microsoft.com/office/drawing/2010/main" val="0"/>
-              </a:ext>
-            </a:extLst>
-          </a:blip>
-          <a:stretch>
-            <a:fillRect/>
-          </a:stretch>
-        </p:blipFill>
-        <p:spPr>
-          <a:xfrm>
-            <a:off x="544594" y="5017975"/>
-            <a:ext cx="596900" cy="673100"/>
-          </a:xfrm>
-          <a:prstGeom prst="rect">
-            <a:avLst/>
-          </a:prstGeom>
-        </p:spPr>
-      </p:pic>
-      <p:pic>
-        <p:nvPicPr>
-          <p:cNvPr id="13" name="Picture 12" descr="Facebook-Like-button.png"/>
-          <p:cNvPicPr>
-            <a:picLocks noChangeAspect="1"/>
-          </p:cNvPicPr>
-          <p:nvPr/>
-        </p:nvPicPr>
-        <p:blipFill>
-          <a:blip r:embed="rId4">
-            <a:extLst>
-              <a:ext uri="{28A0092B-C50C-407E-A947-70E740481C1C}">
-                <a14:useLocalDpi xmlns:a14="http://schemas.microsoft.com/office/drawing/2010/main" val="0"/>
-              </a:ext>
-            </a:extLst>
-          </a:blip>
-          <a:stretch>
-            <a:fillRect/>
-          </a:stretch>
-        </p:blipFill>
-        <p:spPr>
-          <a:xfrm>
-            <a:off x="2547896" y="5017975"/>
-            <a:ext cx="733771" cy="469272"/>
-          </a:xfrm>
-          <a:prstGeom prst="rect">
-            <a:avLst/>
-          </a:prstGeom>
-        </p:spPr>
-      </p:pic>
-      <p:pic>
-        <p:nvPicPr>
-          <p:cNvPr id="15" name="Picture 14" descr="Screen shot 2011-04-04 at 6.21.18 PM.png"/>
-          <p:cNvPicPr>
-            <a:picLocks noChangeAspect="1"/>
-          </p:cNvPicPr>
-          <p:nvPr/>
-        </p:nvPicPr>
-        <p:blipFill>
-          <a:blip r:embed="rId5">
-            <a:extLst>
-              <a:ext uri="{28A0092B-C50C-407E-A947-70E740481C1C}">
-                <a14:useLocalDpi xmlns:a14="http://schemas.microsoft.com/office/drawing/2010/main" val="0"/>
-              </a:ext>
-            </a:extLst>
-          </a:blip>
-          <a:stretch>
-            <a:fillRect/>
-          </a:stretch>
-        </p:blipFill>
-        <p:spPr>
-          <a:xfrm>
-            <a:off x="4403969" y="4120300"/>
-            <a:ext cx="4740031" cy="2737700"/>
-          </a:xfrm>
-          <a:prstGeom prst="rect">
-            <a:avLst/>
-          </a:prstGeom>
+          <a:noFill/>
+          <a:extLst>
+            <a:ext uri="{909E8E84-426E-40dd-AFC4-6F175D3DCCD1}">
+              <a14:hiddenFill xmlns:a14="http://schemas.microsoft.com/office/drawing/2010/main">
+                <a:solidFill>
+                  <a:srgbClr val="FFFFFF"/>
+                </a:solidFill>
+              </a14:hiddenFill>
+            </a:ext>
+          </a:extLst>
         </p:spPr>
       </p:pic>
     </p:spTree>
     <p:extLst>
       <p:ext uri="{BB962C8B-B14F-4D97-AF65-F5344CB8AC3E}">
-        <p14:creationId xmlns:p14="http://schemas.microsoft.com/office/powerpoint/2010/main" val="1704279229"/>
+        <p14:creationId xmlns:p14="http://schemas.microsoft.com/office/powerpoint/2010/main" val="539949483"/>
       </p:ext>
     </p:extLst>
   </p:cSld>
   <p:clrMapOvr>
     <a:masterClrMapping/>
   </p:clrMapOvr>
-  <mc:AlternateContent xmlns:mc="http://schemas.openxmlformats.org/markup-compatibility/2006">
-    <mc:Choice xmlns:p14="http://schemas.microsoft.com/office/powerpoint/2010/main" Requires="p14">
+  <mc:AlternateContent xmlns:mc="http://schemas.openxmlformats.org/markup-compatibility/2006" xmlns:p14="http://schemas.microsoft.com/office/powerpoint/2010/main">
+    <mc:Choice Requires="p14">
       <p:transition spd="med" p14:dur="700">
         <p:fade/>
       </p:transition>
     </mc:Choice>
-    <mc:Fallback>
+    <mc:Fallback xmlns="">
       <p:transition xmlns:p14="http://schemas.microsoft.com/office/powerpoint/2010/main" spd="med">
         <p:fade/>
       </p:transition>
@@ -4835,133 +4938,60 @@
             <p:ph type="title"/>
           </p:nvPr>
         </p:nvSpPr>
-        <p:spPr/>
-        <p:txBody>
-          <a:bodyPr/>
-          <a:lstStyle/>
-          <a:p>
-            <a:r>
-              <a:rPr lang="en-US" dirty="0" smtClean="0"/>
-              <a:t>Making it pretty</a:t>
-            </a:r>
-            <a:endParaRPr lang="en-US" dirty="0"/>
-          </a:p>
-        </p:txBody>
-      </p:sp>
-      <p:sp>
-        <p:nvSpPr>
-          <p:cNvPr id="3" name="Content Placeholder 2"/>
-          <p:cNvSpPr>
-            <a:spLocks noGrp="1"/>
-          </p:cNvSpPr>
-          <p:nvPr>
-            <p:ph idx="1"/>
-          </p:nvPr>
-        </p:nvSpPr>
-        <p:spPr/>
-        <p:txBody>
-          <a:bodyPr/>
-          <a:lstStyle/>
-          <a:p>
-            <a:r>
-              <a:rPr lang="en-US" dirty="0" smtClean="0"/>
-              <a:t>We also mocked up a modern UI:</a:t>
-            </a:r>
-          </a:p>
-          <a:p>
-            <a:pPr lvl="1"/>
-            <a:r>
-              <a:rPr lang="en-US" dirty="0" smtClean="0"/>
-              <a:t>Cleaner</a:t>
-            </a:r>
-          </a:p>
-          <a:p>
-            <a:pPr lvl="1"/>
-            <a:r>
-              <a:rPr lang="en-US" dirty="0" smtClean="0"/>
-              <a:t>Better usability</a:t>
-            </a:r>
-          </a:p>
-          <a:p>
-            <a:pPr lvl="1"/>
-            <a:r>
-              <a:rPr lang="en-US" dirty="0" smtClean="0"/>
-              <a:t>Just plain sexy</a:t>
-            </a:r>
-            <a:endParaRPr lang="en-US" dirty="0"/>
-          </a:p>
-        </p:txBody>
-      </p:sp>
-      <p:sp>
-        <p:nvSpPr>
-          <p:cNvPr id="4" name="Slide Number Placeholder 3"/>
-          <p:cNvSpPr>
-            <a:spLocks noGrp="1"/>
-          </p:cNvSpPr>
-          <p:nvPr>
-            <p:ph type="sldNum" sz="quarter" idx="12"/>
-          </p:nvPr>
-        </p:nvSpPr>
-        <p:spPr/>
-        <p:txBody>
-          <a:bodyPr/>
-          <a:lstStyle/>
-          <a:p>
-            <a:fld id="{0FB56013-B943-42BA-886F-6F9D4EB85E9D}" type="slidenum">
-              <a:rPr lang="en-US" smtClean="0"/>
-              <a:t>4</a:t>
-            </a:fld>
-            <a:endParaRPr lang="en-US"/>
-          </a:p>
-        </p:txBody>
-      </p:sp>
-      <p:pic>
-        <p:nvPicPr>
-          <p:cNvPr id="6" name="Picture 5" descr="Screen shot 2011-04-04 at 6.15.54 PM.png"/>
-          <p:cNvPicPr>
-            <a:picLocks noChangeAspect="1"/>
-          </p:cNvPicPr>
-          <p:nvPr/>
-        </p:nvPicPr>
-        <p:blipFill>
-          <a:blip r:embed="rId2">
-            <a:extLst>
-              <a:ext uri="{28A0092B-C50C-407E-A947-70E740481C1C}">
-                <a14:useLocalDpi xmlns:a14="http://schemas.microsoft.com/office/drawing/2010/main" val="0"/>
-              </a:ext>
-            </a:extLst>
-          </a:blip>
-          <a:stretch>
-            <a:fillRect/>
-          </a:stretch>
-        </p:blipFill>
         <p:spPr>
           <a:xfrm>
-            <a:off x="4404671" y="3256506"/>
-            <a:ext cx="4739329" cy="3601494"/>
+            <a:off x="306060" y="2798684"/>
+            <a:ext cx="8229600" cy="1143000"/>
           </a:xfrm>
-          <a:prstGeom prst="rect">
-            <a:avLst/>
-          </a:prstGeom>
         </p:spPr>
-      </p:pic>
+        <p:txBody>
+          <a:bodyPr/>
+          <a:lstStyle/>
+          <a:p>
+            <a:r>
+              <a:rPr lang="en-US" dirty="0" smtClean="0"/>
+              <a:t>We can do better</a:t>
+            </a:r>
+            <a:endParaRPr lang="en-US" dirty="0"/>
+          </a:p>
+        </p:txBody>
+      </p:sp>
+      <p:sp>
+        <p:nvSpPr>
+          <p:cNvPr id="5" name="Slide Number Placeholder 4"/>
+          <p:cNvSpPr>
+            <a:spLocks noGrp="1"/>
+          </p:cNvSpPr>
+          <p:nvPr>
+            <p:ph type="sldNum" sz="quarter" idx="12"/>
+          </p:nvPr>
+        </p:nvSpPr>
+        <p:spPr/>
+        <p:txBody>
+          <a:bodyPr/>
+          <a:lstStyle/>
+          <a:p>
+            <a:endParaRPr lang="en-US" dirty="0"/>
+          </a:p>
+        </p:txBody>
+      </p:sp>
     </p:spTree>
     <p:extLst>
       <p:ext uri="{BB962C8B-B14F-4D97-AF65-F5344CB8AC3E}">
-        <p14:creationId xmlns:p14="http://schemas.microsoft.com/office/powerpoint/2010/main" val="4214613337"/>
+        <p14:creationId xmlns:p14="http://schemas.microsoft.com/office/powerpoint/2010/main" val="3119770959"/>
       </p:ext>
     </p:extLst>
   </p:cSld>
   <p:clrMapOvr>
     <a:masterClrMapping/>
   </p:clrMapOvr>
-  <mc:AlternateContent xmlns:mc="http://schemas.openxmlformats.org/markup-compatibility/2006">
-    <mc:Choice xmlns:p14="http://schemas.microsoft.com/office/powerpoint/2010/main" Requires="p14">
+  <mc:AlternateContent xmlns:mc="http://schemas.openxmlformats.org/markup-compatibility/2006" xmlns:p14="http://schemas.microsoft.com/office/powerpoint/2010/main">
+    <mc:Choice Requires="p14">
       <p:transition spd="med" p14:dur="700">
         <p:fade/>
       </p:transition>
     </mc:Choice>
-    <mc:Fallback>
+    <mc:Fallback xmlns="">
       <p:transition xmlns:p14="http://schemas.microsoft.com/office/powerpoint/2010/main" spd="med">
         <p:fade/>
       </p:transition>
@@ -5004,14 +5034,19 @@
             <p:ph type="title"/>
           </p:nvPr>
         </p:nvSpPr>
-        <p:spPr/>
+        <p:spPr>
+          <a:xfrm>
+            <a:off x="457200" y="440892"/>
+            <a:ext cx="8229600" cy="1143000"/>
+          </a:xfrm>
+        </p:spPr>
         <p:txBody>
           <a:bodyPr/>
           <a:lstStyle/>
           <a:p>
             <a:r>
               <a:rPr lang="en-US" dirty="0" smtClean="0"/>
-              <a:t>Demo</a:t>
+              <a:t>The Idea</a:t>
             </a:r>
             <a:endParaRPr lang="en-US" dirty="0"/>
           </a:p>
@@ -5027,32 +5062,33 @@
             <p:ph idx="1"/>
           </p:nvPr>
         </p:nvSpPr>
-        <p:spPr/>
+        <p:spPr>
+          <a:xfrm>
+            <a:off x="532770" y="2193624"/>
+            <a:ext cx="8452532" cy="2287692"/>
+          </a:xfrm>
+        </p:spPr>
         <p:txBody>
           <a:bodyPr>
             <a:normAutofit/>
           </a:bodyPr>
           <a:lstStyle/>
           <a:p>
-            <a:r>
-              <a:rPr lang="en-US" sz="2800" dirty="0" smtClean="0">
-                <a:hlinkClick r:id="rId2"/>
-              </a:rPr>
-              <a:t>courseoverflow.web.cs.illinois.edu</a:t>
-            </a:r>
-            <a:r>
-              <a:rPr lang="en-US" sz="2800" dirty="0">
-                <a:hlinkClick r:id="rId2"/>
-              </a:rPr>
-              <a:t>/</a:t>
-            </a:r>
-            <a:r>
-              <a:rPr lang="en-US" sz="2800" dirty="0" err="1" smtClean="0">
-                <a:hlinkClick r:id="rId2"/>
-              </a:rPr>
-              <a:t>CourseOverflow</a:t>
-            </a:r>
-            <a:endParaRPr lang="en-US" sz="2800" dirty="0"/>
+            <a:pPr marL="0" indent="0">
+              <a:buNone/>
+            </a:pPr>
+            <a:r>
+              <a:rPr lang="en-US" sz="3100" dirty="0" smtClean="0"/>
+              <a:t>Use social media to bring newsgroups into 21</a:t>
+            </a:r>
+            <a:r>
+              <a:rPr lang="en-US" sz="3100" baseline="30000" dirty="0" smtClean="0"/>
+              <a:t>st</a:t>
+            </a:r>
+            <a:r>
+              <a:rPr lang="en-US" sz="3100" dirty="0" smtClean="0"/>
+              <a:t> century</a:t>
+            </a:r>
           </a:p>
         </p:txBody>
       </p:sp>
@@ -5100,29 +5136,148 @@
             </a:fld>
             <a:r>
               <a:rPr lang="en-US" dirty="0" smtClean="0"/>
-              <a:t>/7</a:t>
+              <a:t>/10</a:t>
+            </a:r>
+          </a:p>
+        </p:txBody>
+      </p:sp>
+      <p:pic>
+        <p:nvPicPr>
+          <p:cNvPr id="6" name="Picture 5" descr="stackoverflow-logo-250.png"/>
+          <p:cNvPicPr>
+            <a:picLocks noChangeAspect="1"/>
+          </p:cNvPicPr>
+          <p:nvPr/>
+        </p:nvPicPr>
+        <p:blipFill>
+          <a:blip r:embed="rId2">
+            <a:extLst>
+              <a:ext uri="{28A0092B-C50C-407E-A947-70E740481C1C}">
+                <a14:useLocalDpi xmlns:a14="http://schemas.microsoft.com/office/drawing/2010/main" val="0"/>
+              </a:ext>
+            </a:extLst>
+          </a:blip>
+          <a:stretch>
+            <a:fillRect/>
+          </a:stretch>
+        </p:blipFill>
+        <p:spPr>
+          <a:xfrm>
+            <a:off x="2844800" y="5304555"/>
+            <a:ext cx="3175000" cy="889000"/>
+          </a:xfrm>
+          <a:prstGeom prst="rect">
+            <a:avLst/>
+          </a:prstGeom>
+        </p:spPr>
+      </p:pic>
+      <p:sp>
+        <p:nvSpPr>
+          <p:cNvPr id="7" name="TextBox 6"/>
+          <p:cNvSpPr txBox="1"/>
+          <p:nvPr/>
+        </p:nvSpPr>
+        <p:spPr>
+          <a:xfrm>
+            <a:off x="544736" y="5541154"/>
+            <a:ext cx="2300064" cy="369332"/>
+          </a:xfrm>
+          <a:prstGeom prst="rect">
+            <a:avLst/>
+          </a:prstGeom>
+          <a:noFill/>
+        </p:spPr>
+        <p:txBody>
+          <a:bodyPr wrap="square" rtlCol="0">
+            <a:spAutoFit/>
+          </a:bodyPr>
+          <a:lstStyle/>
+          <a:p>
+            <a:r>
+              <a:rPr lang="en-US" dirty="0" smtClean="0"/>
+              <a:t>With influence from </a:t>
             </a:r>
             <a:endParaRPr lang="en-US" dirty="0"/>
           </a:p>
         </p:txBody>
       </p:sp>
+      <p:sp>
+        <p:nvSpPr>
+          <p:cNvPr id="8" name="TextBox 7"/>
+          <p:cNvSpPr txBox="1"/>
+          <p:nvPr/>
+        </p:nvSpPr>
+        <p:spPr>
+          <a:xfrm>
+            <a:off x="6261395" y="5541154"/>
+            <a:ext cx="1620044" cy="369332"/>
+          </a:xfrm>
+          <a:prstGeom prst="rect">
+            <a:avLst/>
+          </a:prstGeom>
+          <a:noFill/>
+        </p:spPr>
+        <p:txBody>
+          <a:bodyPr wrap="square" rtlCol="0">
+            <a:spAutoFit/>
+          </a:bodyPr>
+          <a:lstStyle/>
+          <a:p>
+            <a:r>
+              <a:rPr lang="en-US" dirty="0" smtClean="0"/>
+              <a:t>and</a:t>
+            </a:r>
+            <a:endParaRPr lang="en-US" dirty="0"/>
+          </a:p>
+        </p:txBody>
+      </p:sp>
+      <p:pic>
+        <p:nvPicPr>
+          <p:cNvPr id="9" name="Picture 8" descr="30b563f81d9dbd9bd6833c778e57fef3.jpeg"/>
+          <p:cNvPicPr>
+            <a:picLocks noChangeAspect="1"/>
+          </p:cNvPicPr>
+          <p:nvPr/>
+        </p:nvPicPr>
+        <p:blipFill>
+          <a:blip r:embed="rId3" cstate="email">
+            <a:extLst>
+              <a:ext uri="{28A0092B-C50C-407E-A947-70E740481C1C}">
+                <a14:useLocalDpi xmlns:a14="http://schemas.microsoft.com/office/drawing/2010/main" val="0"/>
+              </a:ext>
+            </a:extLst>
+          </a:blip>
+          <a:stretch>
+            <a:fillRect/>
+          </a:stretch>
+        </p:blipFill>
+        <p:spPr>
+          <a:xfrm>
+            <a:off x="7071417" y="5304556"/>
+            <a:ext cx="889000" cy="889000"/>
+          </a:xfrm>
+          <a:prstGeom prst="rect">
+            <a:avLst/>
+          </a:prstGeom>
+        </p:spPr>
+      </p:pic>
     </p:spTree>
     <p:extLst>
       <p:ext uri="{BB962C8B-B14F-4D97-AF65-F5344CB8AC3E}">
-        <p14:creationId xmlns:p14="http://schemas.microsoft.com/office/powerpoint/2010/main" val="3467467175"/>
+        <p14:creationId xmlns:p14="http://schemas.microsoft.com/office/powerpoint/2010/main" val="618166451"/>
       </p:ext>
     </p:extLst>
   </p:cSld>
   <p:clrMapOvr>
     <a:masterClrMapping/>
   </p:clrMapOvr>
-  <mc:AlternateContent xmlns:mc="http://schemas.openxmlformats.org/markup-compatibility/2006">
-    <mc:Choice xmlns:p14="http://schemas.microsoft.com/office/powerpoint/2010/main" Requires="p14">
+  <mc:AlternateContent xmlns:mc="http://schemas.openxmlformats.org/markup-compatibility/2006" xmlns:p14="http://schemas.microsoft.com/office/powerpoint/2010/main">
+    <mc:Choice Requires="p14">
       <p:transition spd="med" p14:dur="700">
         <p:fade/>
       </p:transition>
     </mc:Choice>
-    <mc:Fallback>
+    <mc:Fallback xmlns="">
       <p:transition xmlns:p14="http://schemas.microsoft.com/office/powerpoint/2010/main" spd="med">
         <p:fade/>
       </p:transition>
@@ -5172,7 +5327,7 @@
           <a:p>
             <a:r>
               <a:rPr lang="en-US" dirty="0" smtClean="0"/>
-              <a:t>Features we could still add</a:t>
+              <a:t>(Sexy) Client Demo</a:t>
             </a:r>
             <a:endParaRPr lang="en-US" dirty="0"/>
           </a:p>
@@ -5188,53 +5343,57 @@
             <p:ph idx="1"/>
           </p:nvPr>
         </p:nvSpPr>
-        <p:spPr/>
+        <p:spPr>
+          <a:xfrm>
+            <a:off x="1764882" y="1600200"/>
+            <a:ext cx="8229600" cy="4525963"/>
+          </a:xfrm>
+        </p:spPr>
+        <p:txBody>
+          <a:bodyPr>
+            <a:normAutofit/>
+          </a:bodyPr>
+          <a:lstStyle/>
+          <a:p>
+            <a:pPr marL="0" indent="0">
+              <a:buNone/>
+            </a:pPr>
+            <a:r>
+              <a:rPr lang="en-US" sz="1600" dirty="0" smtClean="0"/>
+              <a:t>http://courseoverflow.web.cs.illinois.edu/CourseOverflow/html</a:t>
+            </a:r>
+            <a:endParaRPr lang="en-US" sz="1600" dirty="0"/>
+          </a:p>
+          <a:p>
+            <a:endParaRPr lang="en-US" sz="2800" dirty="0"/>
+          </a:p>
+        </p:txBody>
+      </p:sp>
+      <p:sp>
+        <p:nvSpPr>
+          <p:cNvPr id="4" name="Footer Placeholder 3"/>
+          <p:cNvSpPr>
+            <a:spLocks noGrp="1"/>
+          </p:cNvSpPr>
+          <p:nvPr>
+            <p:ph type="ftr" sz="quarter" idx="11"/>
+          </p:nvPr>
+        </p:nvSpPr>
+        <p:spPr>
+          <a:xfrm>
+            <a:off x="2939784" y="6356350"/>
+            <a:ext cx="2895600" cy="365125"/>
+          </a:xfrm>
+        </p:spPr>
         <p:txBody>
           <a:bodyPr/>
           <a:lstStyle/>
           <a:p>
             <a:r>
               <a:rPr lang="en-US" dirty="0" smtClean="0"/>
-              <a:t>Auto-subscribe students to their class newsgroups with UIUC Bluestem</a:t>
-            </a:r>
-          </a:p>
-          <a:p>
-            <a:r>
-              <a:rPr lang="en-US" dirty="0" smtClean="0"/>
-              <a:t>Notifications when someone replies to you</a:t>
-            </a:r>
-          </a:p>
-          <a:p>
-            <a:r>
-              <a:rPr lang="en-US" dirty="0" smtClean="0"/>
-              <a:t>Crown for the user with the highest-rep</a:t>
-            </a:r>
-          </a:p>
-          <a:p>
+              <a:t>Computing Habitat Programming Competition 2011</a:t>
+            </a:r>
             <a:endParaRPr lang="en-US" dirty="0"/>
-          </a:p>
-        </p:txBody>
-      </p:sp>
-      <p:sp>
-        <p:nvSpPr>
-          <p:cNvPr id="4" name="Footer Placeholder 3"/>
-          <p:cNvSpPr>
-            <a:spLocks noGrp="1"/>
-          </p:cNvSpPr>
-          <p:nvPr>
-            <p:ph type="ftr" sz="quarter" idx="11"/>
-          </p:nvPr>
-        </p:nvSpPr>
-        <p:spPr/>
-        <p:txBody>
-          <a:bodyPr/>
-          <a:lstStyle/>
-          <a:p>
-            <a:r>
-              <a:rPr lang="en-US" smtClean="0"/>
-              <a:t>Computing Habitat Programming Competition 2011</a:t>
-            </a:r>
-            <a:endParaRPr lang="en-US"/>
           </a:p>
         </p:txBody>
       </p:sp>
@@ -5259,29 +5418,59 @@
             </a:fld>
             <a:r>
               <a:rPr lang="en-US" dirty="0" smtClean="0"/>
-              <a:t>/7</a:t>
+              <a:t>/10</a:t>
             </a:r>
             <a:endParaRPr lang="en-US" dirty="0"/>
           </a:p>
         </p:txBody>
       </p:sp>
+      <p:pic>
+        <p:nvPicPr>
+          <p:cNvPr id="6" name="Picture 5" descr="Screen shot 2011-04-04 at 6.15.54 PM.png"/>
+          <p:cNvPicPr>
+            <a:picLocks noChangeAspect="1"/>
+          </p:cNvPicPr>
+          <p:nvPr/>
+        </p:nvPicPr>
+        <p:blipFill>
+          <a:blip r:embed="rId2">
+            <a:extLst>
+              <a:ext uri="{28A0092B-C50C-407E-A947-70E740481C1C}">
+                <a14:useLocalDpi xmlns:a14="http://schemas.microsoft.com/office/drawing/2010/main" val="0"/>
+              </a:ext>
+            </a:extLst>
+          </a:blip>
+          <a:stretch>
+            <a:fillRect/>
+          </a:stretch>
+        </p:blipFill>
+        <p:spPr>
+          <a:xfrm>
+            <a:off x="2137564" y="2296764"/>
+            <a:ext cx="4739329" cy="3601494"/>
+          </a:xfrm>
+          <a:prstGeom prst="rect">
+            <a:avLst/>
+          </a:prstGeom>
+        </p:spPr>
+      </p:pic>
     </p:spTree>
     <p:extLst>
       <p:ext uri="{BB962C8B-B14F-4D97-AF65-F5344CB8AC3E}">
-        <p14:creationId xmlns:p14="http://schemas.microsoft.com/office/powerpoint/2010/main" val="3770897757"/>
+        <p14:creationId xmlns:p14="http://schemas.microsoft.com/office/powerpoint/2010/main" val="3467467175"/>
       </p:ext>
     </p:extLst>
   </p:cSld>
   <p:clrMapOvr>
     <a:masterClrMapping/>
   </p:clrMapOvr>
-  <mc:AlternateContent xmlns:mc="http://schemas.openxmlformats.org/markup-compatibility/2006">
-    <mc:Choice xmlns:p14="http://schemas.microsoft.com/office/powerpoint/2010/main" Requires="p14">
+  <mc:AlternateContent xmlns:mc="http://schemas.openxmlformats.org/markup-compatibility/2006" xmlns:p14="http://schemas.microsoft.com/office/powerpoint/2010/main">
+    <mc:Choice Requires="p14">
       <p:transition spd="med" p14:dur="700">
         <p:fade/>
       </p:transition>
     </mc:Choice>
-    <mc:Fallback>
+    <mc:Fallback xmlns="">
       <p:transition xmlns:p14="http://schemas.microsoft.com/office/powerpoint/2010/main" spd="med">
         <p:fade/>
       </p:transition>
@@ -5324,14 +5513,19 @@
             <p:ph type="title"/>
           </p:nvPr>
         </p:nvSpPr>
-        <p:spPr/>
+        <p:spPr>
+          <a:xfrm>
+            <a:off x="364992" y="274638"/>
+            <a:ext cx="8229600" cy="1143000"/>
+          </a:xfrm>
+        </p:spPr>
         <p:txBody>
           <a:bodyPr/>
           <a:lstStyle/>
           <a:p>
             <a:r>
               <a:rPr lang="en-US" dirty="0" smtClean="0"/>
-              <a:t>Thanks + Questions</a:t>
+              <a:t>API Demo</a:t>
             </a:r>
             <a:endParaRPr lang="en-US" dirty="0"/>
           </a:p>
@@ -5339,6 +5533,42 @@
       </p:sp>
       <p:sp>
         <p:nvSpPr>
+          <p:cNvPr id="3" name="Content Placeholder 2"/>
+          <p:cNvSpPr>
+            <a:spLocks noGrp="1"/>
+          </p:cNvSpPr>
+          <p:nvPr>
+            <p:ph idx="1"/>
+          </p:nvPr>
+        </p:nvSpPr>
+        <p:spPr>
+          <a:xfrm>
+            <a:off x="1772566" y="1600200"/>
+            <a:ext cx="8229600" cy="4525963"/>
+          </a:xfrm>
+        </p:spPr>
+        <p:txBody>
+          <a:bodyPr>
+            <a:normAutofit/>
+          </a:bodyPr>
+          <a:lstStyle/>
+          <a:p>
+            <a:pPr marL="0" indent="0">
+              <a:buNone/>
+            </a:pPr>
+            <a:r>
+              <a:rPr lang="en-US" sz="1600" dirty="0" smtClean="0"/>
+              <a:t>http://courseoverflow.web.cs.illinois.edu/CourseOverflow/api</a:t>
+            </a:r>
+            <a:endParaRPr lang="en-US" sz="1600" dirty="0"/>
+          </a:p>
+          <a:p>
+            <a:endParaRPr lang="en-US" sz="2800" dirty="0"/>
+          </a:p>
+        </p:txBody>
+      </p:sp>
+      <p:sp>
+        <p:nvSpPr>
           <p:cNvPr id="4" name="Footer Placeholder 3"/>
           <p:cNvSpPr>
             <a:spLocks noGrp="1"/>
@@ -5347,7 +5577,12 @@
             <p:ph type="ftr" sz="quarter" idx="11"/>
           </p:nvPr>
         </p:nvSpPr>
-        <p:spPr/>
+        <p:spPr>
+          <a:xfrm>
+            <a:off x="2942985" y="6356350"/>
+            <a:ext cx="2895600" cy="365125"/>
+          </a:xfrm>
+        </p:spPr>
         <p:txBody>
           <a:bodyPr/>
           <a:lstStyle/>
@@ -5356,8 +5591,6 @@
               <a:rPr lang="en-US" dirty="0" smtClean="0"/>
               <a:t>Computing Habitat Programming Competition 2011</a:t>
             </a:r>
-          </a:p>
-          <a:p>
             <a:endParaRPr lang="en-US" dirty="0"/>
           </a:p>
         </p:txBody>
@@ -5372,96 +5605,204 @@
             <p:ph type="sldNum" sz="quarter" idx="12"/>
           </p:nvPr>
         </p:nvSpPr>
-        <p:spPr>
+        <p:spPr/>
+        <p:txBody>
+          <a:bodyPr/>
+          <a:lstStyle/>
+          <a:p>
+            <a:fld id="{0FB56013-B943-42BA-886F-6F9D4EB85E9D}" type="slidenum">
+              <a:rPr lang="en-US" smtClean="0"/>
+              <a:t>7</a:t>
+            </a:fld>
+            <a:r>
+              <a:rPr lang="en-US" dirty="0" smtClean="0"/>
+              <a:t>/10</a:t>
+            </a:r>
+          </a:p>
+        </p:txBody>
+      </p:sp>
+      <p:pic>
+        <p:nvPicPr>
+          <p:cNvPr id="2050" name="Picture 2" descr="\\ad.uiuc.edu\engr\ews\ryali1\Desktop\api.PNG"/>
+          <p:cNvPicPr>
+            <a:picLocks noChangeAspect="1" noChangeArrowheads="1"/>
+          </p:cNvPicPr>
+          <p:nvPr/>
+        </p:nvPicPr>
+        <p:blipFill>
+          <a:blip r:embed="rId2" cstate="email">
+            <a:extLst>
+              <a:ext uri="{28A0092B-C50C-407E-A947-70E740481C1C}">
+                <a14:useLocalDpi xmlns:a14="http://schemas.microsoft.com/office/drawing/2010/main" val="0"/>
+              </a:ext>
+            </a:extLst>
+          </a:blip>
+          <a:srcRect/>
+          <a:stretch>
+            <a:fillRect/>
+          </a:stretch>
+        </p:blipFill>
+        <p:spPr bwMode="auto">
           <a:xfrm>
-            <a:off x="6260171" y="6259810"/>
-            <a:ext cx="2426629" cy="365125"/>
-          </a:xfrm>
-        </p:spPr>
-        <p:txBody>
-          <a:bodyPr/>
-          <a:lstStyle/>
-          <a:p>
-            <a:r>
-              <a:rPr lang="en-US" dirty="0" smtClean="0"/>
-              <a:t>Bryan Mishkin (bmishk2)</a:t>
-            </a:r>
-          </a:p>
-          <a:p>
-            <a:r>
-              <a:rPr lang="en-US" dirty="0" smtClean="0"/>
-              <a:t>Joseph </a:t>
-            </a:r>
-            <a:r>
-              <a:rPr lang="en-US" dirty="0" err="1" smtClean="0"/>
-              <a:t>Kaczmarek</a:t>
-            </a:r>
-            <a:r>
-              <a:rPr lang="en-US" dirty="0" smtClean="0"/>
-              <a:t> (jkaczma2)</a:t>
-            </a:r>
-          </a:p>
-          <a:p>
-            <a:r>
-              <a:rPr lang="en-US" dirty="0" err="1" smtClean="0"/>
-              <a:t>Kiran</a:t>
-            </a:r>
-            <a:r>
-              <a:rPr lang="en-US" dirty="0" smtClean="0"/>
-              <a:t> </a:t>
-            </a:r>
-            <a:r>
-              <a:rPr lang="en-US" dirty="0" err="1" smtClean="0"/>
-              <a:t>Ryali</a:t>
-            </a:r>
-            <a:r>
-              <a:rPr lang="en-US" dirty="0" smtClean="0"/>
-              <a:t> (ryali1) </a:t>
-            </a:r>
-            <a:endParaRPr lang="en-US" dirty="0"/>
-          </a:p>
-        </p:txBody>
-      </p:sp>
-      <p:sp>
-        <p:nvSpPr>
-          <p:cNvPr id="6" name="TextBox 5"/>
-          <p:cNvSpPr txBox="1"/>
-          <p:nvPr/>
-        </p:nvSpPr>
-        <p:spPr>
-          <a:xfrm>
-            <a:off x="290008" y="6259810"/>
-            <a:ext cx="2070057" cy="461665"/>
+            <a:off x="2161802" y="2303183"/>
+            <a:ext cx="4569412" cy="3613260"/>
           </a:xfrm>
           <a:prstGeom prst="rect">
             <a:avLst/>
           </a:prstGeom>
           <a:noFill/>
+          <a:extLst>
+            <a:ext uri="{909E8E84-426E-40dd-AFC4-6F175D3DCCD1}">
+              <a14:hiddenFill xmlns:a14="http://schemas.microsoft.com/office/drawing/2010/main">
+                <a:solidFill>
+                  <a:srgbClr val="FFFFFF"/>
+                </a:solidFill>
+              </a14:hiddenFill>
+            </a:ext>
+          </a:extLst>
         </p:spPr>
-        <p:txBody>
-          <a:bodyPr wrap="square" rtlCol="0">
-            <a:spAutoFit/>
-          </a:bodyPr>
-          <a:lstStyle/>
-          <a:p>
-            <a:r>
-              <a:rPr lang="en-US" sz="1200" dirty="0" smtClean="0"/>
-              <a:t>University of Illinois at Urbana-Champaign</a:t>
-            </a:r>
-            <a:endParaRPr lang="en-US" sz="1200" dirty="0"/>
+      </p:pic>
+    </p:spTree>
+    <p:extLst>
+      <p:ext uri="{BB962C8B-B14F-4D97-AF65-F5344CB8AC3E}">
+        <p14:creationId xmlns:p14="http://schemas.microsoft.com/office/powerpoint/2010/main" val="595385667"/>
+      </p:ext>
+    </p:extLst>
+  </p:cSld>
+  <p:clrMapOvr>
+    <a:masterClrMapping/>
+  </p:clrMapOvr>
+  <mc:AlternateContent xmlns:mc="http://schemas.openxmlformats.org/markup-compatibility/2006" xmlns:p14="http://schemas.microsoft.com/office/powerpoint/2010/main">
+    <mc:Choice Requires="p14">
+      <p:transition spd="med" p14:dur="700">
+        <p:fade/>
+      </p:transition>
+    </mc:Choice>
+    <mc:Fallback xmlns="">
+      <p:transition xmlns:p14="http://schemas.microsoft.com/office/powerpoint/2010/main" spd="med">
+        <p:fade/>
+      </p:transition>
+    </mc:Fallback>
+  </mc:AlternateContent>
+  <p:timing>
+    <p:tnLst>
+      <p:par>
+        <p:cTn xmlns:p14="http://schemas.microsoft.com/office/powerpoint/2010/main" id="1" dur="indefinite" restart="never" nodeType="tmRoot"/>
+      </p:par>
+    </p:tnLst>
+  </p:timing>
+</p:sld>
+</file>
+
+<file path=ppt/slides/slide8.xml><?xml version="1.0" encoding="utf-8"?>
+<p:sld xmlns:a="http://schemas.openxmlformats.org/drawingml/2006/main" xmlns:r="http://schemas.openxmlformats.org/officeDocument/2006/relationships" xmlns:p="http://schemas.openxmlformats.org/presentationml/2006/main">
+  <p:cSld>
+    <p:spTree>
+      <p:nvGrpSpPr>
+        <p:cNvPr id="1" name=""/>
+        <p:cNvGrpSpPr/>
+        <p:nvPr/>
+      </p:nvGrpSpPr>
+      <p:grpSpPr>
+        <a:xfrm>
+          <a:off x="0" y="0"/>
+          <a:ext cx="0" cy="0"/>
+          <a:chOff x="0" y="0"/>
+          <a:chExt cx="0" cy="0"/>
+        </a:xfrm>
+      </p:grpSpPr>
+      <p:sp>
+        <p:nvSpPr>
+          <p:cNvPr id="2" name="Title 1"/>
+          <p:cNvSpPr>
+            <a:spLocks noGrp="1"/>
+          </p:cNvSpPr>
+          <p:nvPr>
+            <p:ph type="title"/>
+          </p:nvPr>
+        </p:nvSpPr>
+        <p:spPr/>
+        <p:txBody>
+          <a:bodyPr/>
+          <a:lstStyle/>
+          <a:p>
+            <a:r>
+              <a:rPr lang="en-US" dirty="0" smtClean="0"/>
+              <a:t>Future proofing the newsgroups</a:t>
+            </a:r>
+            <a:endParaRPr lang="en-US" dirty="0"/>
+          </a:p>
+        </p:txBody>
+      </p:sp>
+      <p:sp>
+        <p:nvSpPr>
+          <p:cNvPr id="5" name="Content Placeholder 4"/>
+          <p:cNvSpPr>
+            <a:spLocks noGrp="1"/>
+          </p:cNvSpPr>
+          <p:nvPr>
+            <p:ph idx="1"/>
+          </p:nvPr>
+        </p:nvSpPr>
+        <p:spPr/>
+        <p:txBody>
+          <a:bodyPr/>
+          <a:lstStyle/>
+          <a:p>
+            <a:r>
+              <a:rPr lang="en-US" dirty="0" smtClean="0"/>
+              <a:t>We built an API that newsgroup readers can plug into for:</a:t>
+            </a:r>
+          </a:p>
+          <a:p>
+            <a:pPr lvl="1"/>
+            <a:r>
+              <a:rPr lang="en-US" dirty="0" smtClean="0"/>
+              <a:t>User reputations based on voting</a:t>
+            </a:r>
+          </a:p>
+          <a:p>
+            <a:pPr lvl="1"/>
+            <a:r>
+              <a:rPr lang="en-US" dirty="0" smtClean="0"/>
+              <a:t>Remembering what classes students are in</a:t>
+            </a:r>
+          </a:p>
+        </p:txBody>
+      </p:sp>
+      <p:sp>
+        <p:nvSpPr>
+          <p:cNvPr id="6" name="Slide Number Placeholder 5"/>
+          <p:cNvSpPr>
+            <a:spLocks noGrp="1"/>
+          </p:cNvSpPr>
+          <p:nvPr>
+            <p:ph type="sldNum" sz="quarter" idx="12"/>
+          </p:nvPr>
+        </p:nvSpPr>
+        <p:spPr/>
+        <p:txBody>
+          <a:bodyPr/>
+          <a:lstStyle/>
+          <a:p>
+            <a:fld id="{0FB56013-B943-42BA-886F-6F9D4EB85E9D}" type="slidenum">
+              <a:rPr lang="en-US" smtClean="0"/>
+              <a:t>8</a:t>
+            </a:fld>
+            <a:endParaRPr lang="en-US"/>
           </a:p>
         </p:txBody>
       </p:sp>
       <p:pic>
         <p:nvPicPr>
-          <p:cNvPr id="8" name="Picture 7" descr="Screen shot 2011-04-04 at 6.21.18 PM.png"/>
+          <p:cNvPr id="15" name="Picture 14" descr="Screen shot 2011-04-04 at 6.21.18 PM.png"/>
           <p:cNvPicPr>
             <a:picLocks noChangeAspect="1"/>
           </p:cNvPicPr>
           <p:nvPr/>
         </p:nvPicPr>
         <p:blipFill>
-          <a:blip r:embed="rId2">
+          <a:blip r:embed="rId2" cstate="email">
             <a:extLst>
               <a:ext uri="{28A0092B-C50C-407E-A947-70E740481C1C}">
                 <a14:useLocalDpi xmlns:a14="http://schemas.microsoft.com/office/drawing/2010/main" val="0"/>
@@ -5474,61 +5815,198 @@
         </p:blipFill>
         <p:spPr>
           <a:xfrm>
-            <a:off x="370010" y="1593826"/>
-            <a:ext cx="5094137" cy="2942221"/>
+            <a:off x="4403969" y="4120300"/>
+            <a:ext cx="4740031" cy="2737700"/>
           </a:xfrm>
           <a:prstGeom prst="rect">
             <a:avLst/>
           </a:prstGeom>
         </p:spPr>
       </p:pic>
-      <p:pic>
-        <p:nvPicPr>
-          <p:cNvPr id="7" name="Content Placeholder 6" descr="Screen shot 2011-04-04 at 6.28.00 PM.png"/>
-          <p:cNvPicPr>
-            <a:picLocks noGrp="1" noChangeAspect="1"/>
-          </p:cNvPicPr>
-          <p:nvPr>
-            <p:ph idx="1"/>
-          </p:nvPr>
-        </p:nvPicPr>
-        <p:blipFill>
-          <a:blip r:embed="rId3">
-            <a:extLst>
-              <a:ext uri="{28A0092B-C50C-407E-A947-70E740481C1C}">
-                <a14:useLocalDpi xmlns:a14="http://schemas.microsoft.com/office/drawing/2010/main" val="0"/>
-              </a:ext>
-            </a:extLst>
-          </a:blip>
-          <a:srcRect t="12431" b="12431"/>
-          <a:stretch>
-            <a:fillRect/>
-          </a:stretch>
-        </p:blipFill>
-        <p:spPr>
-          <a:xfrm>
-            <a:off x="3014197" y="2403887"/>
-            <a:ext cx="5793040" cy="3185949"/>
-          </a:xfrm>
-        </p:spPr>
-      </p:pic>
     </p:spTree>
     <p:extLst>
       <p:ext uri="{BB962C8B-B14F-4D97-AF65-F5344CB8AC3E}">
-        <p14:creationId xmlns:p14="http://schemas.microsoft.com/office/powerpoint/2010/main" val="1638797427"/>
+        <p14:creationId xmlns:p14="http://schemas.microsoft.com/office/powerpoint/2010/main" val="1704279229"/>
       </p:ext>
     </p:extLst>
   </p:cSld>
   <p:clrMapOvr>
     <a:masterClrMapping/>
   </p:clrMapOvr>
-  <mc:AlternateContent xmlns:mc="http://schemas.openxmlformats.org/markup-compatibility/2006">
-    <mc:Choice xmlns:p14="http://schemas.microsoft.com/office/powerpoint/2010/main" Requires="p14">
+  <mc:AlternateContent xmlns:mc="http://schemas.openxmlformats.org/markup-compatibility/2006" xmlns:p14="http://schemas.microsoft.com/office/powerpoint/2010/main">
+    <mc:Choice Requires="p14">
       <p:transition spd="med" p14:dur="700">
         <p:fade/>
       </p:transition>
     </mc:Choice>
-    <mc:Fallback>
+    <mc:Fallback xmlns="">
+      <p:transition xmlns:p14="http://schemas.microsoft.com/office/powerpoint/2010/main" spd="med">
+        <p:fade/>
+      </p:transition>
+    </mc:Fallback>
+  </mc:AlternateContent>
+  <p:timing>
+    <p:tnLst>
+      <p:par>
+        <p:cTn xmlns:p14="http://schemas.microsoft.com/office/powerpoint/2010/main" id="1" dur="indefinite" restart="never" nodeType="tmRoot"/>
+      </p:par>
+    </p:tnLst>
+  </p:timing>
+</p:sld>
+</file>
+
+<file path=ppt/slides/slide9.xml><?xml version="1.0" encoding="utf-8"?>
+<p:sld xmlns:a="http://schemas.openxmlformats.org/drawingml/2006/main" xmlns:r="http://schemas.openxmlformats.org/officeDocument/2006/relationships" xmlns:p="http://schemas.openxmlformats.org/presentationml/2006/main">
+  <p:cSld>
+    <p:spTree>
+      <p:nvGrpSpPr>
+        <p:cNvPr id="1" name=""/>
+        <p:cNvGrpSpPr/>
+        <p:nvPr/>
+      </p:nvGrpSpPr>
+      <p:grpSpPr>
+        <a:xfrm>
+          <a:off x="0" y="0"/>
+          <a:ext cx="0" cy="0"/>
+          <a:chOff x="0" y="0"/>
+          <a:chExt cx="0" cy="0"/>
+        </a:xfrm>
+      </p:grpSpPr>
+      <p:sp>
+        <p:nvSpPr>
+          <p:cNvPr id="2" name="Title 1"/>
+          <p:cNvSpPr>
+            <a:spLocks noGrp="1"/>
+          </p:cNvSpPr>
+          <p:nvPr>
+            <p:ph type="title"/>
+          </p:nvPr>
+        </p:nvSpPr>
+        <p:spPr/>
+        <p:txBody>
+          <a:bodyPr/>
+          <a:lstStyle/>
+          <a:p>
+            <a:r>
+              <a:rPr lang="en-US" dirty="0" smtClean="0"/>
+              <a:t>Features we could still add</a:t>
+            </a:r>
+            <a:endParaRPr lang="en-US" dirty="0"/>
+          </a:p>
+        </p:txBody>
+      </p:sp>
+      <p:sp>
+        <p:nvSpPr>
+          <p:cNvPr id="3" name="Content Placeholder 2"/>
+          <p:cNvSpPr>
+            <a:spLocks noGrp="1"/>
+          </p:cNvSpPr>
+          <p:nvPr>
+            <p:ph idx="1"/>
+          </p:nvPr>
+        </p:nvSpPr>
+        <p:spPr/>
+        <p:txBody>
+          <a:bodyPr/>
+          <a:lstStyle/>
+          <a:p>
+            <a:r>
+              <a:rPr lang="en-US" dirty="0" smtClean="0"/>
+              <a:t>Auto-subscribe students to their class</a:t>
+            </a:r>
+          </a:p>
+          <a:p>
+            <a:r>
+              <a:rPr lang="en-US" dirty="0" smtClean="0"/>
+              <a:t>Notifications when someone replies to you</a:t>
+            </a:r>
+          </a:p>
+          <a:p>
+            <a:r>
+              <a:rPr lang="en-US" dirty="0" smtClean="0"/>
+              <a:t>Achievements and Badges</a:t>
+            </a:r>
+          </a:p>
+          <a:p>
+            <a:r>
+              <a:rPr lang="en-US" dirty="0" smtClean="0"/>
+              <a:t>Code specific markup</a:t>
+            </a:r>
+          </a:p>
+          <a:p>
+            <a:r>
+              <a:rPr lang="en-US" dirty="0" smtClean="0"/>
+              <a:t>“Follow” discussions</a:t>
+            </a:r>
+          </a:p>
+          <a:p>
+            <a:endParaRPr lang="en-US" dirty="0"/>
+          </a:p>
+        </p:txBody>
+      </p:sp>
+      <p:sp>
+        <p:nvSpPr>
+          <p:cNvPr id="4" name="Footer Placeholder 3"/>
+          <p:cNvSpPr>
+            <a:spLocks noGrp="1"/>
+          </p:cNvSpPr>
+          <p:nvPr>
+            <p:ph type="ftr" sz="quarter" idx="11"/>
+          </p:nvPr>
+        </p:nvSpPr>
+        <p:spPr/>
+        <p:txBody>
+          <a:bodyPr/>
+          <a:lstStyle/>
+          <a:p>
+            <a:r>
+              <a:rPr lang="en-US" dirty="0" smtClean="0"/>
+              <a:t>Computing Habitat Programming Competition 2011</a:t>
+            </a:r>
+            <a:endParaRPr lang="en-US" dirty="0"/>
+          </a:p>
+        </p:txBody>
+      </p:sp>
+      <p:sp>
+        <p:nvSpPr>
+          <p:cNvPr id="5" name="Slide Number Placeholder 4"/>
+          <p:cNvSpPr>
+            <a:spLocks noGrp="1"/>
+          </p:cNvSpPr>
+          <p:nvPr>
+            <p:ph type="sldNum" sz="quarter" idx="12"/>
+          </p:nvPr>
+        </p:nvSpPr>
+        <p:spPr/>
+        <p:txBody>
+          <a:bodyPr/>
+          <a:lstStyle/>
+          <a:p>
+            <a:r>
+              <a:rPr lang="en-US" dirty="0" smtClean="0"/>
+              <a:t>9/10</a:t>
+            </a:r>
+            <a:endParaRPr lang="en-US" dirty="0"/>
+          </a:p>
+        </p:txBody>
+      </p:sp>
+    </p:spTree>
+    <p:extLst>
+      <p:ext uri="{BB962C8B-B14F-4D97-AF65-F5344CB8AC3E}">
+        <p14:creationId xmlns:p14="http://schemas.microsoft.com/office/powerpoint/2010/main" val="3770897757"/>
+      </p:ext>
+    </p:extLst>
+  </p:cSld>
+  <p:clrMapOvr>
+    <a:masterClrMapping/>
+  </p:clrMapOvr>
+  <mc:AlternateContent xmlns:mc="http://schemas.openxmlformats.org/markup-compatibility/2006" xmlns:p14="http://schemas.microsoft.com/office/powerpoint/2010/main">
+    <mc:Choice Requires="p14">
+      <p:transition spd="med" p14:dur="700">
+        <p:fade/>
+      </p:transition>
+    </mc:Choice>
+    <mc:Fallback xmlns="">
       <p:transition xmlns:p14="http://schemas.microsoft.com/office/powerpoint/2010/main" spd="med">
         <p:fade/>
       </p:transition>

</xml_diff>